<commit_message>
GoPro presentation edit, Bachelor ATDD first topic
</commit_message>
<xml_diff>
--- a/data/documents/Herrmann_Bjarne_GoPro.pptx
+++ b/data/documents/Herrmann_Bjarne_GoPro.pptx
@@ -6817,7 +6817,10 @@
           <a:bodyPr/>
           <a:lstStyle/>
           <a:p>
-            <a:endParaRPr lang="de-DE" dirty="0"/>
+            <a:r>
+              <a:rPr lang="de-DE" dirty="0"/>
+              <a:t>Pfeil Senkrecht runter von Model</a:t>
+            </a:r>
           </a:p>
         </p:txBody>
       </p:sp>
@@ -6901,6 +6904,34 @@
           <a:bodyPr/>
           <a:lstStyle/>
           <a:p>
+            <a:r>
+              <a:rPr lang="de-DE" dirty="0"/>
+              <a:t>Abgeschnitten </a:t>
+            </a:r>
+            <a:r>
+              <a:rPr lang="de-DE" dirty="0">
+                <a:sym typeface="Wingdings" panose="05000000000000000000" pitchFamily="2" charset="2"/>
+              </a:rPr>
+              <a:t> kann verwirren  Kommentieren / </a:t>
+            </a:r>
+            <a:r>
+              <a:rPr lang="de-DE" dirty="0" err="1">
+                <a:sym typeface="Wingdings" panose="05000000000000000000" pitchFamily="2" charset="2"/>
+              </a:rPr>
+              <a:t>Vll</a:t>
+            </a:r>
+            <a:r>
+              <a:rPr lang="de-DE" dirty="0">
+                <a:sym typeface="Wingdings" panose="05000000000000000000" pitchFamily="2" charset="2"/>
+              </a:rPr>
+              <a:t>. </a:t>
+            </a:r>
+            <a:r>
+              <a:rPr lang="de-DE">
+                <a:sym typeface="Wingdings" panose="05000000000000000000" pitchFamily="2" charset="2"/>
+              </a:rPr>
+              <a:t>verbessern</a:t>
+            </a:r>
             <a:endParaRPr lang="de-DE" dirty="0"/>
           </a:p>
         </p:txBody>
@@ -6983,7 +7014,7 @@
           <a:graphicData uri="http://schemas.openxmlformats.org/presentationml/2006/ole">
             <mc:AlternateContent xmlns:mc="http://schemas.openxmlformats.org/markup-compatibility/2006">
               <mc:Choice xmlns:v="urn:schemas-microsoft-com:vml" Requires="v">
-                <p:oleObj spid="_x0000_s12425" name="think-cell Folie" r:id="rId5" imgW="344" imgH="345" progId="TCLayout.ActiveDocument.1">
+                <p:oleObj spid="_x0000_s12436" name="think-cell Folie" r:id="rId5" imgW="344" imgH="345" progId="TCLayout.ActiveDocument.1">
                   <p:embed/>
                 </p:oleObj>
               </mc:Choice>
@@ -7882,7 +7913,7 @@
           <a:graphicData uri="http://schemas.openxmlformats.org/presentationml/2006/ole">
             <mc:AlternateContent xmlns:mc="http://schemas.openxmlformats.org/markup-compatibility/2006">
               <mc:Choice xmlns:v="urn:schemas-microsoft-com:vml" Requires="v">
-                <p:oleObj spid="_x0000_s10376" name="think-cell Folie" r:id="rId4" imgW="344" imgH="345" progId="TCLayout.ActiveDocument.1">
+                <p:oleObj spid="_x0000_s10387" name="think-cell Folie" r:id="rId4" imgW="344" imgH="345" progId="TCLayout.ActiveDocument.1">
                   <p:embed/>
                 </p:oleObj>
               </mc:Choice>
@@ -8269,7 +8300,7 @@
           <a:p>
             <a:fld id="{E514B224-5848-41E4-83E8-3646E3C858CD}" type="datetime1">
               <a:rPr lang="de-DE" smtClean="0"/>
-              <a:t>17.07.2020</a:t>
+              <a:t>20.07.2020</a:t>
             </a:fld>
             <a:endParaRPr lang="en-GB"/>
           </a:p>
@@ -8499,7 +8530,7 @@
           <a:p>
             <a:fld id="{C4956EC5-7C62-4377-BC2B-AC7237B5C885}" type="datetime1">
               <a:rPr lang="de-DE" smtClean="0"/>
-              <a:t>17.07.2020</a:t>
+              <a:t>20.07.2020</a:t>
             </a:fld>
             <a:endParaRPr lang="en-GB"/>
           </a:p>
@@ -8838,7 +8869,7 @@
           <a:p>
             <a:fld id="{4C75EAC1-B2EA-4787-9039-A0C7FA5C39AA}" type="datetime1">
               <a:rPr lang="de-DE" smtClean="0"/>
-              <a:t>17.07.2020</a:t>
+              <a:t>20.07.2020</a:t>
             </a:fld>
             <a:endParaRPr lang="en-GB"/>
           </a:p>
@@ -9263,7 +9294,7 @@
           <a:p>
             <a:fld id="{A9BDF7B2-AE09-4CB1-ADA1-5437FBFCAD44}" type="datetime1">
               <a:rPr lang="de-DE" smtClean="0"/>
-              <a:t>17.07.2020</a:t>
+              <a:t>20.07.2020</a:t>
             </a:fld>
             <a:endParaRPr lang="en-GB"/>
           </a:p>
@@ -9599,7 +9630,7 @@
           <a:graphicData uri="http://schemas.openxmlformats.org/presentationml/2006/ole">
             <mc:AlternateContent xmlns:mc="http://schemas.openxmlformats.org/markup-compatibility/2006">
               <mc:Choice xmlns:v="urn:schemas-microsoft-com:vml" Requires="v">
-                <p:oleObj spid="_x0000_s8338" name="think-cell Folie" r:id="rId5" imgW="344" imgH="345" progId="TCLayout.ActiveDocument.1">
+                <p:oleObj spid="_x0000_s8349" name="think-cell Folie" r:id="rId5" imgW="344" imgH="345" progId="TCLayout.ActiveDocument.1">
                   <p:embed/>
                 </p:oleObj>
               </mc:Choice>
@@ -10765,7 +10796,7 @@
           <a:graphicData uri="http://schemas.openxmlformats.org/presentationml/2006/ole">
             <mc:AlternateContent xmlns:mc="http://schemas.openxmlformats.org/markup-compatibility/2006">
               <mc:Choice xmlns:v="urn:schemas-microsoft-com:vml" Requires="v">
-                <p:oleObj spid="_x0000_s6294" name="think-cell Folie" r:id="rId5" imgW="344" imgH="345" progId="TCLayout.ActiveDocument.1">
+                <p:oleObj spid="_x0000_s6305" name="think-cell Folie" r:id="rId5" imgW="344" imgH="345" progId="TCLayout.ActiveDocument.1">
                   <p:embed/>
                 </p:oleObj>
               </mc:Choice>
@@ -11593,7 +11624,7 @@
           <a:graphicData uri="http://schemas.openxmlformats.org/presentationml/2006/ole">
             <mc:AlternateContent xmlns:mc="http://schemas.openxmlformats.org/markup-compatibility/2006">
               <mc:Choice xmlns:v="urn:schemas-microsoft-com:vml" Requires="v">
-                <p:oleObj spid="_x0000_s13428" name="think-cell Folie" r:id="rId5" imgW="344" imgH="345" progId="TCLayout.ActiveDocument.1">
+                <p:oleObj spid="_x0000_s13439" name="think-cell Folie" r:id="rId5" imgW="344" imgH="345" progId="TCLayout.ActiveDocument.1">
                   <p:embed/>
                 </p:oleObj>
               </mc:Choice>
@@ -12818,7 +12849,7 @@
           <a:graphicData uri="http://schemas.openxmlformats.org/presentationml/2006/ole">
             <mc:AlternateContent xmlns:mc="http://schemas.openxmlformats.org/markup-compatibility/2006">
               <mc:Choice xmlns:v="urn:schemas-microsoft-com:vml" Requires="v">
-                <p:oleObj spid="_x0000_s9363" name="think-cell Folie" r:id="rId4" imgW="344" imgH="345" progId="TCLayout.ActiveDocument.1">
+                <p:oleObj spid="_x0000_s9374" name="think-cell Folie" r:id="rId4" imgW="344" imgH="345" progId="TCLayout.ActiveDocument.1">
                   <p:embed/>
                 </p:oleObj>
               </mc:Choice>
@@ -13492,7 +13523,7 @@
           <a:graphicData uri="http://schemas.openxmlformats.org/presentationml/2006/ole">
             <mc:AlternateContent xmlns:mc="http://schemas.openxmlformats.org/markup-compatibility/2006">
               <mc:Choice xmlns:v="urn:schemas-microsoft-com:vml" Requires="v">
-                <p:oleObj spid="_x0000_s7316" name="think-cell Folie" r:id="rId5" imgW="344" imgH="345" progId="TCLayout.ActiveDocument.1">
+                <p:oleObj spid="_x0000_s7327" name="think-cell Folie" r:id="rId5" imgW="344" imgH="345" progId="TCLayout.ActiveDocument.1">
                   <p:embed/>
                 </p:oleObj>
               </mc:Choice>
@@ -13619,7 +13650,7 @@
           <a:p>
             <a:fld id="{34ED33ED-86EF-43E0-BBFC-3F79D10AF08C}" type="datetime1">
               <a:rPr lang="de-DE" smtClean="0"/>
-              <a:t>17.07.2020</a:t>
+              <a:t>20.07.2020</a:t>
             </a:fld>
             <a:endParaRPr lang="en-GB"/>
           </a:p>
@@ -13896,7 +13927,7 @@
           <a:p>
             <a:fld id="{6FA40309-AA06-43DE-A277-059A46DC32ED}" type="datetime1">
               <a:rPr lang="de-DE" smtClean="0"/>
-              <a:t>17.07.2020</a:t>
+              <a:t>20.07.2020</a:t>
             </a:fld>
             <a:endParaRPr lang="en-GB"/>
           </a:p>
@@ -14203,7 +14234,7 @@
           <a:p>
             <a:fld id="{C2E208CA-E75F-4040-B41E-9BAD50EA4F3B}" type="datetime1">
               <a:rPr lang="de-DE" smtClean="0"/>
-              <a:t>17.07.2020</a:t>
+              <a:t>20.07.2020</a:t>
             </a:fld>
             <a:endParaRPr lang="en-GB"/>
           </a:p>
@@ -14465,7 +14496,7 @@
           <a:p>
             <a:fld id="{37091A67-CCD8-478F-8AFD-2777D0E4A009}" type="datetime1">
               <a:rPr lang="de-DE" smtClean="0"/>
-              <a:t>17.07.2020</a:t>
+              <a:t>20.07.2020</a:t>
             </a:fld>
             <a:endParaRPr lang="en-GB"/>
           </a:p>
@@ -14914,7 +14945,7 @@
           <a:p>
             <a:fld id="{E522EC6F-1043-42A9-B89A-8627A45F02AF}" type="datetime1">
               <a:rPr lang="de-DE" smtClean="0"/>
-              <a:t>17.07.2020</a:t>
+              <a:t>20.07.2020</a:t>
             </a:fld>
             <a:endParaRPr lang="de-DE" dirty="0"/>
           </a:p>
@@ -15742,7 +15773,7 @@
           <a:p>
             <a:fld id="{FB9AFF1A-74F3-4769-B3E7-7F748D88A726}" type="datetime1">
               <a:rPr lang="de-DE" smtClean="0"/>
-              <a:t>17.07.2020</a:t>
+              <a:t>20.07.2020</a:t>
             </a:fld>
             <a:r>
               <a:rPr lang="de-DE" dirty="0"/>
@@ -15816,7 +15847,7 @@
           <a:p>
             <a:fld id="{34ED33ED-86EF-43E0-BBFC-3F79D10AF08C}" type="datetime1">
               <a:rPr lang="de-DE" smtClean="0"/>
-              <a:t>17.07.2020</a:t>
+              <a:t>20.07.2020</a:t>
             </a:fld>
             <a:endParaRPr lang="en-GB" dirty="0"/>
           </a:p>
@@ -16385,7 +16416,7 @@
           <a:p>
             <a:fld id="{34ED33ED-86EF-43E0-BBFC-3F79D10AF08C}" type="datetime1">
               <a:rPr lang="de-DE" smtClean="0"/>
-              <a:t>17.07.2020</a:t>
+              <a:t>20.07.2020</a:t>
             </a:fld>
             <a:endParaRPr lang="en-GB" dirty="0"/>
           </a:p>
@@ -16786,7 +16817,7 @@
           <a:p>
             <a:fld id="{34ED33ED-86EF-43E0-BBFC-3F79D10AF08C}" type="datetime1">
               <a:rPr lang="de-DE" smtClean="0"/>
-              <a:t>17.07.2020</a:t>
+              <a:t>20.07.2020</a:t>
             </a:fld>
             <a:endParaRPr lang="en-GB" dirty="0"/>
           </a:p>
@@ -18100,7 +18131,7 @@
           <a:p>
             <a:fld id="{34ED33ED-86EF-43E0-BBFC-3F79D10AF08C}" type="datetime1">
               <a:rPr lang="de-DE" smtClean="0"/>
-              <a:t>17.07.2020</a:t>
+              <a:t>20.07.2020</a:t>
             </a:fld>
             <a:endParaRPr lang="en-GB" dirty="0"/>
           </a:p>
@@ -19205,7 +19236,7 @@
           <a:p>
             <a:fld id="{34ED33ED-86EF-43E0-BBFC-3F79D10AF08C}" type="datetime1">
               <a:rPr lang="de-DE" smtClean="0"/>
-              <a:t>17.07.2020</a:t>
+              <a:t>20.07.2020</a:t>
             </a:fld>
             <a:endParaRPr lang="en-GB" dirty="0"/>
           </a:p>
@@ -20127,7 +20158,7 @@
           <a:p>
             <a:fld id="{34ED33ED-86EF-43E0-BBFC-3F79D10AF08C}" type="datetime1">
               <a:rPr lang="de-DE" smtClean="0"/>
-              <a:t>17.07.2020</a:t>
+              <a:t>20.07.2020</a:t>
             </a:fld>
             <a:endParaRPr lang="en-GB"/>
           </a:p>
@@ -20353,7 +20384,7 @@
           <a:p>
             <a:fld id="{34ED33ED-86EF-43E0-BBFC-3F79D10AF08C}" type="datetime1">
               <a:rPr lang="de-DE" smtClean="0"/>
-              <a:t>17.07.2020</a:t>
+              <a:t>20.07.2020</a:t>
             </a:fld>
             <a:endParaRPr lang="en-GB"/>
           </a:p>
@@ -20670,7 +20701,7 @@
           <a:p>
             <a:fld id="{34ED33ED-86EF-43E0-BBFC-3F79D10AF08C}" type="datetime1">
               <a:rPr lang="de-DE" smtClean="0"/>
-              <a:t>17.07.2020</a:t>
+              <a:t>20.07.2020</a:t>
             </a:fld>
             <a:endParaRPr lang="en-GB" dirty="0"/>
           </a:p>
@@ -21513,7 +21544,7 @@
           <a:graphicData uri="http://schemas.openxmlformats.org/presentationml/2006/ole">
             <mc:AlternateContent xmlns:mc="http://schemas.openxmlformats.org/markup-compatibility/2006">
               <mc:Choice xmlns:v="urn:schemas-microsoft-com:vml" Requires="v">
-                <p:oleObj spid="_x0000_s1175" name="think-cell Folie" r:id="rId7" imgW="344" imgH="345" progId="TCLayout.ActiveDocument.1">
+                <p:oleObj spid="_x0000_s1186" name="think-cell Folie" r:id="rId7" imgW="344" imgH="345" progId="TCLayout.ActiveDocument.1">
                   <p:embed/>
                 </p:oleObj>
               </mc:Choice>
@@ -21668,7 +21699,7 @@
           <a:p>
             <a:fld id="{34ED33ED-86EF-43E0-BBFC-3F79D10AF08C}" type="datetime1">
               <a:rPr lang="de-DE" smtClean="0"/>
-              <a:t>17.07.2020</a:t>
+              <a:t>20.07.2020</a:t>
             </a:fld>
             <a:endParaRPr lang="en-GB"/>
           </a:p>
@@ -22464,7 +22495,7 @@
           <a:graphicData uri="http://schemas.openxmlformats.org/presentationml/2006/ole">
             <mc:AlternateContent xmlns:mc="http://schemas.openxmlformats.org/markup-compatibility/2006">
               <mc:Choice xmlns:v="urn:schemas-microsoft-com:vml" Requires="v">
-                <p:oleObj spid="_x0000_s14463" name="think-cell Folie" r:id="rId6" imgW="344" imgH="345" progId="TCLayout.ActiveDocument.1">
+                <p:oleObj spid="_x0000_s14474" name="think-cell Folie" r:id="rId6" imgW="344" imgH="345" progId="TCLayout.ActiveDocument.1">
                   <p:embed/>
                 </p:oleObj>
               </mc:Choice>
@@ -22521,7 +22552,7 @@
         </p:nvGraphicFramePr>
         <p:xfrm>
           <a:off x="911424" y="2132856"/>
-          <a:ext cx="10883527" cy="3506672"/>
+          <a:ext cx="10883527" cy="3485844"/>
         </p:xfrm>
         <a:graphic>
           <a:graphicData uri="http://schemas.openxmlformats.org/drawingml/2006/table">
@@ -23840,7 +23871,7 @@
           <a:p>
             <a:fld id="{34ED33ED-86EF-43E0-BBFC-3F79D10AF08C}" type="datetime1">
               <a:rPr lang="de-DE" smtClean="0"/>
-              <a:t>17.07.2020</a:t>
+              <a:t>20.07.2020</a:t>
             </a:fld>
             <a:endParaRPr lang="en-GB" dirty="0"/>
           </a:p>
@@ -23965,7 +23996,7 @@
         <p:spPr>
           <a:xfrm>
             <a:off x="371476" y="1412876"/>
-            <a:ext cx="11448000" cy="3477875"/>
+            <a:ext cx="11448000" cy="4344779"/>
           </a:xfrm>
         </p:spPr>
         <p:txBody>
@@ -23989,6 +24020,21 @@
             </a:r>
           </a:p>
           <a:p>
+            <a:pPr marL="645750" lvl="3" indent="-285750"/>
+            <a:r>
+              <a:rPr lang="de-DE" dirty="0"/>
+              <a:t>LCG, Polar-Methode, </a:t>
+            </a:r>
+            <a:r>
+              <a:rPr lang="de-DE" dirty="0" err="1"/>
+              <a:t>Bjarnsche</a:t>
+            </a:r>
+            <a:r>
+              <a:rPr lang="de-DE" dirty="0"/>
+              <a:t>-Zufallszahlenerzeugung</a:t>
+            </a:r>
+          </a:p>
+          <a:p>
             <a:pPr marL="465750" lvl="2" indent="-285750"/>
             <a:r>
               <a:rPr lang="de-DE" dirty="0"/>
@@ -23996,7 +24042,36 @@
             </a:r>
           </a:p>
           <a:p>
-            <a:pPr marL="465750" lvl="2" indent="-285750"/>
+            <a:pPr marL="645750" lvl="3" indent="-285750"/>
+            <a:r>
+              <a:rPr lang="de-DE" dirty="0"/>
+              <a:t>Serielle-Autokorrelation, Sequenz-Up-Down-Test, </a:t>
+            </a:r>
+            <a:r>
+              <a:rPr lang="de-DE" dirty="0" err="1"/>
+              <a:t>Bjarnsche</a:t>
+            </a:r>
+            <a:r>
+              <a:rPr lang="de-DE" dirty="0"/>
+              <a:t>-Gütekriterium</a:t>
+            </a:r>
+          </a:p>
+          <a:p>
+            <a:pPr marL="645750" lvl="3" indent="-285750"/>
+            <a:endParaRPr lang="de-DE" dirty="0">
+              <a:sym typeface="Wingdings" panose="05000000000000000000" pitchFamily="2" charset="2"/>
+            </a:endParaRPr>
+          </a:p>
+          <a:p>
+            <a:pPr lvl="2" indent="0">
+              <a:buNone/>
+            </a:pPr>
+            <a:r>
+              <a:rPr lang="de-DE" dirty="0">
+                <a:sym typeface="Wingdings" panose="05000000000000000000" pitchFamily="2" charset="2"/>
+              </a:rPr>
+              <a:t> </a:t>
+            </a:r>
             <a:r>
               <a:rPr lang="de-DE" dirty="0"/>
               <a:t>Die zu verwendenden Methoden / Verfahren muss angegeben werden können</a:t>
@@ -24280,33 +24355,15 @@
                                   </p:childTnLst>
                                 </p:cTn>
                               </p:par>
-                            </p:childTnLst>
-                          </p:cTn>
-                        </p:par>
-                      </p:childTnLst>
-                    </p:cTn>
-                  </p:par>
-                  <p:par>
-                    <p:cTn id="19" fill="hold">
-                      <p:stCondLst>
-                        <p:cond delay="indefinite"/>
-                      </p:stCondLst>
-                      <p:childTnLst>
-                        <p:par>
-                          <p:cTn id="20" fill="hold">
-                            <p:stCondLst>
-                              <p:cond delay="0"/>
-                            </p:stCondLst>
-                            <p:childTnLst>
                               <p:par>
-                                <p:cTn id="21" presetID="10" presetClass="entr" presetSubtype="0" fill="hold" nodeType="clickEffect">
+                                <p:cTn id="19" presetID="10" presetClass="entr" presetSubtype="0" fill="hold" nodeType="withEffect">
                                   <p:stCondLst>
                                     <p:cond delay="0"/>
                                   </p:stCondLst>
                                   <p:childTnLst>
                                     <p:set>
                                       <p:cBhvr>
-                                        <p:cTn id="22" dur="1" fill="hold">
+                                        <p:cTn id="20" dur="1" fill="hold">
                                           <p:stCondLst>
                                             <p:cond delay="0"/>
                                           </p:stCondLst>
@@ -24314,7 +24371,7 @@
                                         <p:tgtEl>
                                           <p:spTgt spid="7">
                                             <p:txEl>
-                                              <p:pRg st="5" end="5"/>
+                                              <p:pRg st="4" end="4"/>
                                             </p:txEl>
                                           </p:spTgt>
                                         </p:tgtEl>
@@ -24328,11 +24385,11 @@
                                     </p:set>
                                     <p:animEffect transition="in" filter="fade">
                                       <p:cBhvr>
-                                        <p:cTn id="23" dur="500"/>
+                                        <p:cTn id="21" dur="500"/>
                                         <p:tgtEl>
                                           <p:spTgt spid="7">
                                             <p:txEl>
-                                              <p:pRg st="5" end="5"/>
+                                              <p:pRg st="4" end="4"/>
                                             </p:txEl>
                                           </p:spTgt>
                                         </p:tgtEl>
@@ -24342,14 +24399,14 @@
                                 </p:cTn>
                               </p:par>
                               <p:par>
-                                <p:cTn id="24" presetID="10" presetClass="entr" presetSubtype="0" fill="hold" nodeType="withEffect">
+                                <p:cTn id="22" presetID="10" presetClass="entr" presetSubtype="0" fill="hold" nodeType="withEffect">
                                   <p:stCondLst>
                                     <p:cond delay="0"/>
                                   </p:stCondLst>
                                   <p:childTnLst>
                                     <p:set>
                                       <p:cBhvr>
-                                        <p:cTn id="25" dur="1" fill="hold">
+                                        <p:cTn id="23" dur="1" fill="hold">
                                           <p:stCondLst>
                                             <p:cond delay="0"/>
                                           </p:stCondLst>
@@ -24371,7 +24428,7 @@
                                     </p:set>
                                     <p:animEffect transition="in" filter="fade">
                                       <p:cBhvr>
-                                        <p:cTn id="26" dur="500"/>
+                                        <p:cTn id="24" dur="500"/>
                                         <p:tgtEl>
                                           <p:spTgt spid="7">
                                             <p:txEl>
@@ -24384,8 +24441,26 @@
                                   </p:childTnLst>
                                 </p:cTn>
                               </p:par>
+                            </p:childTnLst>
+                          </p:cTn>
+                        </p:par>
+                      </p:childTnLst>
+                    </p:cTn>
+                  </p:par>
+                  <p:par>
+                    <p:cTn id="25" fill="hold">
+                      <p:stCondLst>
+                        <p:cond delay="indefinite"/>
+                      </p:stCondLst>
+                      <p:childTnLst>
+                        <p:par>
+                          <p:cTn id="26" fill="hold">
+                            <p:stCondLst>
+                              <p:cond delay="0"/>
+                            </p:stCondLst>
+                            <p:childTnLst>
                               <p:par>
-                                <p:cTn id="27" presetID="10" presetClass="entr" presetSubtype="0" fill="hold" nodeType="withEffect">
+                                <p:cTn id="27" presetID="10" presetClass="entr" presetSubtype="0" fill="hold" nodeType="clickEffect">
                                   <p:stCondLst>
                                     <p:cond delay="0"/>
                                   </p:stCondLst>
@@ -24400,7 +24475,7 @@
                                         <p:tgtEl>
                                           <p:spTgt spid="7">
                                             <p:txEl>
-                                              <p:pRg st="7" end="7"/>
+                                              <p:pRg st="8" end="8"/>
                                             </p:txEl>
                                           </p:spTgt>
                                         </p:tgtEl>
@@ -24418,7 +24493,7 @@
                                         <p:tgtEl>
                                           <p:spTgt spid="7">
                                             <p:txEl>
-                                              <p:pRg st="7" end="7"/>
+                                              <p:pRg st="8" end="8"/>
                                             </p:txEl>
                                           </p:spTgt>
                                         </p:tgtEl>
@@ -24443,7 +24518,7 @@
                                         <p:tgtEl>
                                           <p:spTgt spid="7">
                                             <p:txEl>
-                                              <p:pRg st="8" end="8"/>
+                                              <p:pRg st="9" end="9"/>
                                             </p:txEl>
                                           </p:spTgt>
                                         </p:tgtEl>
@@ -24461,7 +24536,7 @@
                                         <p:tgtEl>
                                           <p:spTgt spid="7">
                                             <p:txEl>
-                                              <p:pRg st="8" end="8"/>
+                                              <p:pRg st="9" end="9"/>
                                             </p:txEl>
                                           </p:spTgt>
                                         </p:tgtEl>
@@ -24505,6 +24580,92 @@
                                           <p:spTgt spid="7">
                                             <p:txEl>
                                               <p:pRg st="10" end="10"/>
+                                            </p:txEl>
+                                          </p:spTgt>
+                                        </p:tgtEl>
+                                      </p:cBhvr>
+                                    </p:animEffect>
+                                  </p:childTnLst>
+                                </p:cTn>
+                              </p:par>
+                              <p:par>
+                                <p:cTn id="36" presetID="10" presetClass="entr" presetSubtype="0" fill="hold" nodeType="withEffect">
+                                  <p:stCondLst>
+                                    <p:cond delay="0"/>
+                                  </p:stCondLst>
+                                  <p:childTnLst>
+                                    <p:set>
+                                      <p:cBhvr>
+                                        <p:cTn id="37" dur="1" fill="hold">
+                                          <p:stCondLst>
+                                            <p:cond delay="0"/>
+                                          </p:stCondLst>
+                                        </p:cTn>
+                                        <p:tgtEl>
+                                          <p:spTgt spid="7">
+                                            <p:txEl>
+                                              <p:pRg st="11" end="11"/>
+                                            </p:txEl>
+                                          </p:spTgt>
+                                        </p:tgtEl>
+                                        <p:attrNameLst>
+                                          <p:attrName>style.visibility</p:attrName>
+                                        </p:attrNameLst>
+                                      </p:cBhvr>
+                                      <p:to>
+                                        <p:strVal val="visible"/>
+                                      </p:to>
+                                    </p:set>
+                                    <p:animEffect transition="in" filter="fade">
+                                      <p:cBhvr>
+                                        <p:cTn id="38" dur="500"/>
+                                        <p:tgtEl>
+                                          <p:spTgt spid="7">
+                                            <p:txEl>
+                                              <p:pRg st="11" end="11"/>
+                                            </p:txEl>
+                                          </p:spTgt>
+                                        </p:tgtEl>
+                                      </p:cBhvr>
+                                    </p:animEffect>
+                                  </p:childTnLst>
+                                </p:cTn>
+                              </p:par>
+                              <p:par>
+                                <p:cTn id="39" presetID="10" presetClass="entr" presetSubtype="0" fill="hold" nodeType="withEffect">
+                                  <p:stCondLst>
+                                    <p:cond delay="0"/>
+                                  </p:stCondLst>
+                                  <p:childTnLst>
+                                    <p:set>
+                                      <p:cBhvr>
+                                        <p:cTn id="40" dur="1" fill="hold">
+                                          <p:stCondLst>
+                                            <p:cond delay="0"/>
+                                          </p:stCondLst>
+                                        </p:cTn>
+                                        <p:tgtEl>
+                                          <p:spTgt spid="7">
+                                            <p:txEl>
+                                              <p:pRg st="13" end="13"/>
+                                            </p:txEl>
+                                          </p:spTgt>
+                                        </p:tgtEl>
+                                        <p:attrNameLst>
+                                          <p:attrName>style.visibility</p:attrName>
+                                        </p:attrNameLst>
+                                      </p:cBhvr>
+                                      <p:to>
+                                        <p:strVal val="visible"/>
+                                      </p:to>
+                                    </p:set>
+                                    <p:animEffect transition="in" filter="fade">
+                                      <p:cBhvr>
+                                        <p:cTn id="41" dur="500"/>
+                                        <p:tgtEl>
+                                          <p:spTgt spid="7">
+                                            <p:txEl>
+                                              <p:pRg st="13" end="13"/>
                                             </p:txEl>
                                           </p:spTgt>
                                         </p:tgtEl>
@@ -24584,7 +24745,7 @@
           <a:p>
             <a:fld id="{34ED33ED-86EF-43E0-BBFC-3F79D10AF08C}" type="datetime1">
               <a:rPr lang="de-DE" smtClean="0"/>
-              <a:t>17.07.2020</a:t>
+              <a:t>20.07.2020</a:t>
             </a:fld>
             <a:endParaRPr lang="en-GB" dirty="0"/>
           </a:p>
@@ -24709,7 +24870,7 @@
         <p:spPr>
           <a:xfrm>
             <a:off x="371476" y="1412876"/>
-            <a:ext cx="11448000" cy="2405787"/>
+            <a:ext cx="11448000" cy="2703304"/>
           </a:xfrm>
         </p:spPr>
         <p:txBody>
@@ -24729,7 +24890,7 @@
             <a:pPr marL="465750" lvl="2" indent="-285750"/>
             <a:r>
               <a:rPr lang="de-DE" dirty="0"/>
-              <a:t>Anwendung, welche den Zufallsgenerator implizit nutzt</a:t>
+              <a:t>Anwendung, welche den Zufallszahlengenerator implizit nutzt</a:t>
             </a:r>
           </a:p>
           <a:p>
@@ -24751,6 +24912,13 @@
             <a:r>
               <a:rPr lang="de-DE" dirty="0"/>
               <a:t>Einlesen von Testdateien</a:t>
+            </a:r>
+          </a:p>
+          <a:p>
+            <a:pPr marL="645750" lvl="3" indent="-285750"/>
+            <a:r>
+              <a:rPr lang="de-DE" dirty="0"/>
+              <a:t>Verarbeite Informationen</a:t>
             </a:r>
           </a:p>
           <a:p>
@@ -25148,6 +25316,49 @@
                                   </p:childTnLst>
                                 </p:cTn>
                               </p:par>
+                              <p:par>
+                                <p:cTn id="30" presetID="10" presetClass="entr" presetSubtype="0" fill="hold" nodeType="withEffect">
+                                  <p:stCondLst>
+                                    <p:cond delay="0"/>
+                                  </p:stCondLst>
+                                  <p:childTnLst>
+                                    <p:set>
+                                      <p:cBhvr>
+                                        <p:cTn id="31" dur="1" fill="hold">
+                                          <p:stCondLst>
+                                            <p:cond delay="0"/>
+                                          </p:stCondLst>
+                                        </p:cTn>
+                                        <p:tgtEl>
+                                          <p:spTgt spid="7">
+                                            <p:txEl>
+                                              <p:pRg st="7" end="7"/>
+                                            </p:txEl>
+                                          </p:spTgt>
+                                        </p:tgtEl>
+                                        <p:attrNameLst>
+                                          <p:attrName>style.visibility</p:attrName>
+                                        </p:attrNameLst>
+                                      </p:cBhvr>
+                                      <p:to>
+                                        <p:strVal val="visible"/>
+                                      </p:to>
+                                    </p:set>
+                                    <p:animEffect transition="in" filter="fade">
+                                      <p:cBhvr>
+                                        <p:cTn id="32" dur="500"/>
+                                        <p:tgtEl>
+                                          <p:spTgt spid="7">
+                                            <p:txEl>
+                                              <p:pRg st="7" end="7"/>
+                                            </p:txEl>
+                                          </p:spTgt>
+                                        </p:tgtEl>
+                                      </p:cBhvr>
+                                    </p:animEffect>
+                                  </p:childTnLst>
+                                </p:cTn>
+                              </p:par>
                             </p:childTnLst>
                           </p:cTn>
                         </p:par>
@@ -25219,7 +25430,7 @@
           <a:p>
             <a:fld id="{34ED33ED-86EF-43E0-BBFC-3F79D10AF08C}" type="datetime1">
               <a:rPr lang="de-DE" smtClean="0"/>
-              <a:t>17.07.2020</a:t>
+              <a:t>20.07.2020</a:t>
             </a:fld>
             <a:endParaRPr lang="en-GB"/>
           </a:p>
@@ -25344,7 +25555,7 @@
         <p:spPr>
           <a:xfrm>
             <a:off x="370800" y="1412876"/>
-            <a:ext cx="3458741" cy="4447371"/>
+            <a:ext cx="3458741" cy="4770537"/>
           </a:xfrm>
         </p:spPr>
         <p:txBody>
@@ -25448,6 +25659,13 @@
             <a:r>
               <a:rPr lang="de-DE" dirty="0"/>
               <a:t>Ziel: Bewertung</a:t>
+            </a:r>
+          </a:p>
+          <a:p>
+            <a:pPr marL="465750" lvl="2" indent="-285750"/>
+            <a:r>
+              <a:rPr lang="de-DE" dirty="0"/>
+              <a:t>Bewertungstyp: …</a:t>
             </a:r>
           </a:p>
           <a:p>
@@ -26363,6 +26581,49 @@
                                   </p:childTnLst>
                                 </p:cTn>
                               </p:par>
+                              <p:par>
+                                <p:cTn id="36" presetID="10" presetClass="entr" presetSubtype="0" fill="hold" nodeType="withEffect">
+                                  <p:stCondLst>
+                                    <p:cond delay="0"/>
+                                  </p:stCondLst>
+                                  <p:childTnLst>
+                                    <p:set>
+                                      <p:cBhvr>
+                                        <p:cTn id="37" dur="1" fill="hold">
+                                          <p:stCondLst>
+                                            <p:cond delay="0"/>
+                                          </p:stCondLst>
+                                        </p:cTn>
+                                        <p:tgtEl>
+                                          <p:spTgt spid="7">
+                                            <p:txEl>
+                                              <p:pRg st="13" end="13"/>
+                                            </p:txEl>
+                                          </p:spTgt>
+                                        </p:tgtEl>
+                                        <p:attrNameLst>
+                                          <p:attrName>style.visibility</p:attrName>
+                                        </p:attrNameLst>
+                                      </p:cBhvr>
+                                      <p:to>
+                                        <p:strVal val="visible"/>
+                                      </p:to>
+                                    </p:set>
+                                    <p:animEffect transition="in" filter="fade">
+                                      <p:cBhvr>
+                                        <p:cTn id="38" dur="500"/>
+                                        <p:tgtEl>
+                                          <p:spTgt spid="7">
+                                            <p:txEl>
+                                              <p:pRg st="13" end="13"/>
+                                            </p:txEl>
+                                          </p:spTgt>
+                                        </p:tgtEl>
+                                      </p:cBhvr>
+                                    </p:animEffect>
+                                  </p:childTnLst>
+                                </p:cTn>
+                              </p:par>
                             </p:childTnLst>
                           </p:cTn>
                         </p:par>
@@ -26370,26 +26631,26 @@
                     </p:cTn>
                   </p:par>
                   <p:par>
-                    <p:cTn id="36" fill="hold">
+                    <p:cTn id="39" fill="hold">
                       <p:stCondLst>
                         <p:cond delay="indefinite"/>
                       </p:stCondLst>
                       <p:childTnLst>
                         <p:par>
-                          <p:cTn id="37" fill="hold">
+                          <p:cTn id="40" fill="hold">
                             <p:stCondLst>
                               <p:cond delay="0"/>
                             </p:stCondLst>
                             <p:childTnLst>
                               <p:par>
-                                <p:cTn id="38" presetID="10" presetClass="entr" presetSubtype="0" fill="hold" grpId="0" nodeType="clickEffect">
+                                <p:cTn id="41" presetID="10" presetClass="entr" presetSubtype="0" fill="hold" grpId="0" nodeType="clickEffect">
                                   <p:stCondLst>
                                     <p:cond delay="0"/>
                                   </p:stCondLst>
                                   <p:childTnLst>
                                     <p:set>
                                       <p:cBhvr>
-                                        <p:cTn id="39" dur="1" fill="hold">
+                                        <p:cTn id="42" dur="1" fill="hold">
                                           <p:stCondLst>
                                             <p:cond delay="0"/>
                                           </p:stCondLst>
@@ -26407,7 +26668,7 @@
                                     </p:set>
                                     <p:animEffect transition="in" filter="fade">
                                       <p:cBhvr>
-                                        <p:cTn id="40" dur="500"/>
+                                        <p:cTn id="43" dur="500"/>
                                         <p:tgtEl>
                                           <p:spTgt spid="3"/>
                                         </p:tgtEl>
@@ -26417,14 +26678,14 @@
                                 </p:cTn>
                               </p:par>
                               <p:par>
-                                <p:cTn id="41" presetID="10" presetClass="entr" presetSubtype="0" fill="hold" grpId="0" nodeType="withEffect">
+                                <p:cTn id="44" presetID="10" presetClass="entr" presetSubtype="0" fill="hold" grpId="0" nodeType="withEffect">
                                   <p:stCondLst>
                                     <p:cond delay="0"/>
                                   </p:stCondLst>
                                   <p:childTnLst>
                                     <p:set>
                                       <p:cBhvr>
-                                        <p:cTn id="42" dur="1" fill="hold">
+                                        <p:cTn id="45" dur="1" fill="hold">
                                           <p:stCondLst>
                                             <p:cond delay="0"/>
                                           </p:stCondLst>
@@ -26442,52 +26703,9 @@
                                     </p:set>
                                     <p:animEffect transition="in" filter="fade">
                                       <p:cBhvr>
-                                        <p:cTn id="43" dur="500"/>
+                                        <p:cTn id="46" dur="500"/>
                                         <p:tgtEl>
                                           <p:spTgt spid="11"/>
-                                        </p:tgtEl>
-                                      </p:cBhvr>
-                                    </p:animEffect>
-                                  </p:childTnLst>
-                                </p:cTn>
-                              </p:par>
-                              <p:par>
-                                <p:cTn id="44" presetID="10" presetClass="entr" presetSubtype="0" fill="hold" nodeType="withEffect">
-                                  <p:stCondLst>
-                                    <p:cond delay="0"/>
-                                  </p:stCondLst>
-                                  <p:childTnLst>
-                                    <p:set>
-                                      <p:cBhvr>
-                                        <p:cTn id="45" dur="1" fill="hold">
-                                          <p:stCondLst>
-                                            <p:cond delay="0"/>
-                                          </p:stCondLst>
-                                        </p:cTn>
-                                        <p:tgtEl>
-                                          <p:spTgt spid="8">
-                                            <p:txEl>
-                                              <p:pRg st="0" end="0"/>
-                                            </p:txEl>
-                                          </p:spTgt>
-                                        </p:tgtEl>
-                                        <p:attrNameLst>
-                                          <p:attrName>style.visibility</p:attrName>
-                                        </p:attrNameLst>
-                                      </p:cBhvr>
-                                      <p:to>
-                                        <p:strVal val="visible"/>
-                                      </p:to>
-                                    </p:set>
-                                    <p:animEffect transition="in" filter="fade">
-                                      <p:cBhvr>
-                                        <p:cTn id="46" dur="500"/>
-                                        <p:tgtEl>
-                                          <p:spTgt spid="8">
-                                            <p:txEl>
-                                              <p:pRg st="0" end="0"/>
-                                            </p:txEl>
-                                          </p:spTgt>
                                         </p:tgtEl>
                                       </p:cBhvr>
                                     </p:animEffect>
@@ -26510,7 +26728,7 @@
                                         <p:tgtEl>
                                           <p:spTgt spid="8">
                                             <p:txEl>
-                                              <p:pRg st="1" end="1"/>
+                                              <p:pRg st="0" end="0"/>
                                             </p:txEl>
                                           </p:spTgt>
                                         </p:tgtEl>
@@ -26528,7 +26746,7 @@
                                         <p:tgtEl>
                                           <p:spTgt spid="8">
                                             <p:txEl>
-                                              <p:pRg st="1" end="1"/>
+                                              <p:pRg st="0" end="0"/>
                                             </p:txEl>
                                           </p:spTgt>
                                         </p:tgtEl>
@@ -26553,7 +26771,7 @@
                                         <p:tgtEl>
                                           <p:spTgt spid="8">
                                             <p:txEl>
-                                              <p:pRg st="2" end="2"/>
+                                              <p:pRg st="1" end="1"/>
                                             </p:txEl>
                                           </p:spTgt>
                                         </p:tgtEl>
@@ -26571,7 +26789,7 @@
                                         <p:tgtEl>
                                           <p:spTgt spid="8">
                                             <p:txEl>
-                                              <p:pRg st="2" end="2"/>
+                                              <p:pRg st="1" end="1"/>
                                             </p:txEl>
                                           </p:spTgt>
                                         </p:tgtEl>
@@ -26596,7 +26814,7 @@
                                         <p:tgtEl>
                                           <p:spTgt spid="8">
                                             <p:txEl>
-                                              <p:pRg st="10" end="10"/>
+                                              <p:pRg st="2" end="2"/>
                                             </p:txEl>
                                           </p:spTgt>
                                         </p:tgtEl>
@@ -26614,7 +26832,7 @@
                                         <p:tgtEl>
                                           <p:spTgt spid="8">
                                             <p:txEl>
-                                              <p:pRg st="10" end="10"/>
+                                              <p:pRg st="2" end="2"/>
                                             </p:txEl>
                                           </p:spTgt>
                                         </p:tgtEl>
@@ -26639,7 +26857,7 @@
                                         <p:tgtEl>
                                           <p:spTgt spid="8">
                                             <p:txEl>
-                                              <p:pRg st="11" end="11"/>
+                                              <p:pRg st="10" end="10"/>
                                             </p:txEl>
                                           </p:spTgt>
                                         </p:tgtEl>
@@ -26657,7 +26875,7 @@
                                         <p:tgtEl>
                                           <p:spTgt spid="8">
                                             <p:txEl>
-                                              <p:pRg st="11" end="11"/>
+                                              <p:pRg st="10" end="10"/>
                                             </p:txEl>
                                           </p:spTgt>
                                         </p:tgtEl>
@@ -26682,6 +26900,49 @@
                                         <p:tgtEl>
                                           <p:spTgt spid="8">
                                             <p:txEl>
+                                              <p:pRg st="11" end="11"/>
+                                            </p:txEl>
+                                          </p:spTgt>
+                                        </p:tgtEl>
+                                        <p:attrNameLst>
+                                          <p:attrName>style.visibility</p:attrName>
+                                        </p:attrNameLst>
+                                      </p:cBhvr>
+                                      <p:to>
+                                        <p:strVal val="visible"/>
+                                      </p:to>
+                                    </p:set>
+                                    <p:animEffect transition="in" filter="fade">
+                                      <p:cBhvr>
+                                        <p:cTn id="61" dur="500"/>
+                                        <p:tgtEl>
+                                          <p:spTgt spid="8">
+                                            <p:txEl>
+                                              <p:pRg st="11" end="11"/>
+                                            </p:txEl>
+                                          </p:spTgt>
+                                        </p:tgtEl>
+                                      </p:cBhvr>
+                                    </p:animEffect>
+                                  </p:childTnLst>
+                                </p:cTn>
+                              </p:par>
+                              <p:par>
+                                <p:cTn id="62" presetID="10" presetClass="entr" presetSubtype="0" fill="hold" nodeType="withEffect">
+                                  <p:stCondLst>
+                                    <p:cond delay="0"/>
+                                  </p:stCondLst>
+                                  <p:childTnLst>
+                                    <p:set>
+                                      <p:cBhvr>
+                                        <p:cTn id="63" dur="1" fill="hold">
+                                          <p:stCondLst>
+                                            <p:cond delay="0"/>
+                                          </p:stCondLst>
+                                        </p:cTn>
+                                        <p:tgtEl>
+                                          <p:spTgt spid="8">
+                                            <p:txEl>
                                               <p:pRg st="12" end="12"/>
                                             </p:txEl>
                                           </p:spTgt>
@@ -26696,7 +26957,7 @@
                                     </p:set>
                                     <p:animEffect transition="in" filter="fade">
                                       <p:cBhvr>
-                                        <p:cTn id="61" dur="500"/>
+                                        <p:cTn id="64" dur="500"/>
                                         <p:tgtEl>
                                           <p:spTgt spid="8">
                                             <p:txEl>
@@ -26784,7 +27045,7 @@
           <a:p>
             <a:fld id="{34ED33ED-86EF-43E0-BBFC-3F79D10AF08C}" type="datetime1">
               <a:rPr lang="de-DE" smtClean="0"/>
-              <a:t>17.07.2020</a:t>
+              <a:t>20.07.2020</a:t>
             </a:fld>
             <a:endParaRPr lang="en-GB" dirty="0"/>
           </a:p>

</xml_diff>